<commit_message>
discussed about common methods in lib class on 9 May 2021
</commit_message>
<xml_diff>
--- a/src/test/resources/TestNG.pptx
+++ b/src/test/resources/TestNG.pptx
@@ -270,7 +270,7 @@
           <a:p>
             <a:fld id="{474FEC44-FE25-432A-B7F6-7BDB637AC3B5}" type="datetimeFigureOut">
               <a:rPr lang="en-IN" smtClean="0"/>
-              <a:t>16-03-2021</a:t>
+              <a:t>05-05-2021</a:t>
             </a:fld>
             <a:endParaRPr lang="en-IN"/>
           </a:p>
@@ -470,7 +470,7 @@
           <a:p>
             <a:fld id="{474FEC44-FE25-432A-B7F6-7BDB637AC3B5}" type="datetimeFigureOut">
               <a:rPr lang="en-IN" smtClean="0"/>
-              <a:t>16-03-2021</a:t>
+              <a:t>05-05-2021</a:t>
             </a:fld>
             <a:endParaRPr lang="en-IN"/>
           </a:p>
@@ -680,7 +680,7 @@
           <a:p>
             <a:fld id="{474FEC44-FE25-432A-B7F6-7BDB637AC3B5}" type="datetimeFigureOut">
               <a:rPr lang="en-IN" smtClean="0"/>
-              <a:t>16-03-2021</a:t>
+              <a:t>05-05-2021</a:t>
             </a:fld>
             <a:endParaRPr lang="en-IN"/>
           </a:p>
@@ -880,7 +880,7 @@
           <a:p>
             <a:fld id="{474FEC44-FE25-432A-B7F6-7BDB637AC3B5}" type="datetimeFigureOut">
               <a:rPr lang="en-IN" smtClean="0"/>
-              <a:t>16-03-2021</a:t>
+              <a:t>05-05-2021</a:t>
             </a:fld>
             <a:endParaRPr lang="en-IN"/>
           </a:p>
@@ -1156,7 +1156,7 @@
           <a:p>
             <a:fld id="{474FEC44-FE25-432A-B7F6-7BDB637AC3B5}" type="datetimeFigureOut">
               <a:rPr lang="en-IN" smtClean="0"/>
-              <a:t>16-03-2021</a:t>
+              <a:t>05-05-2021</a:t>
             </a:fld>
             <a:endParaRPr lang="en-IN"/>
           </a:p>
@@ -1424,7 +1424,7 @@
           <a:p>
             <a:fld id="{474FEC44-FE25-432A-B7F6-7BDB637AC3B5}" type="datetimeFigureOut">
               <a:rPr lang="en-IN" smtClean="0"/>
-              <a:t>16-03-2021</a:t>
+              <a:t>05-05-2021</a:t>
             </a:fld>
             <a:endParaRPr lang="en-IN"/>
           </a:p>
@@ -1839,7 +1839,7 @@
           <a:p>
             <a:fld id="{474FEC44-FE25-432A-B7F6-7BDB637AC3B5}" type="datetimeFigureOut">
               <a:rPr lang="en-IN" smtClean="0"/>
-              <a:t>16-03-2021</a:t>
+              <a:t>05-05-2021</a:t>
             </a:fld>
             <a:endParaRPr lang="en-IN"/>
           </a:p>
@@ -1981,7 +1981,7 @@
           <a:p>
             <a:fld id="{474FEC44-FE25-432A-B7F6-7BDB637AC3B5}" type="datetimeFigureOut">
               <a:rPr lang="en-IN" smtClean="0"/>
-              <a:t>16-03-2021</a:t>
+              <a:t>05-05-2021</a:t>
             </a:fld>
             <a:endParaRPr lang="en-IN"/>
           </a:p>
@@ -2094,7 +2094,7 @@
           <a:p>
             <a:fld id="{474FEC44-FE25-432A-B7F6-7BDB637AC3B5}" type="datetimeFigureOut">
               <a:rPr lang="en-IN" smtClean="0"/>
-              <a:t>16-03-2021</a:t>
+              <a:t>05-05-2021</a:t>
             </a:fld>
             <a:endParaRPr lang="en-IN"/>
           </a:p>
@@ -2407,7 +2407,7 @@
           <a:p>
             <a:fld id="{474FEC44-FE25-432A-B7F6-7BDB637AC3B5}" type="datetimeFigureOut">
               <a:rPr lang="en-IN" smtClean="0"/>
-              <a:t>16-03-2021</a:t>
+              <a:t>05-05-2021</a:t>
             </a:fld>
             <a:endParaRPr lang="en-IN"/>
           </a:p>
@@ -2696,7 +2696,7 @@
           <a:p>
             <a:fld id="{474FEC44-FE25-432A-B7F6-7BDB637AC3B5}" type="datetimeFigureOut">
               <a:rPr lang="en-IN" smtClean="0"/>
-              <a:t>16-03-2021</a:t>
+              <a:t>05-05-2021</a:t>
             </a:fld>
             <a:endParaRPr lang="en-IN"/>
           </a:p>
@@ -2939,7 +2939,7 @@
           <a:p>
             <a:fld id="{474FEC44-FE25-432A-B7F6-7BDB637AC3B5}" type="datetimeFigureOut">
               <a:rPr lang="en-IN" smtClean="0"/>
-              <a:t>16-03-2021</a:t>
+              <a:t>05-05-2021</a:t>
             </a:fld>
             <a:endParaRPr lang="en-IN"/>
           </a:p>
@@ -6383,7 +6383,25 @@
                 </a:solidFill>
                 <a:latin typeface="Arial" panose="020B0604020202020204" pitchFamily="34" charset="0"/>
               </a:rPr>
-              <a:t>– A factory will execute all the test methods present inside a test class using separate instances of the class. </a:t>
+              <a:t>– A factory will execute all the test methods present inside a test class using separate </a:t>
+            </a:r>
+            <a:r>
+              <a:rPr lang="en-US" sz="2000" b="1" dirty="0">
+                <a:solidFill>
+                  <a:srgbClr val="4D4D4D"/>
+                </a:solidFill>
+                <a:latin typeface="Arial" panose="020B0604020202020204" pitchFamily="34" charset="0"/>
+              </a:rPr>
+              <a:t>instances of the class</a:t>
+            </a:r>
+            <a:r>
+              <a:rPr lang="en-US" sz="2000" dirty="0">
+                <a:solidFill>
+                  <a:srgbClr val="4D4D4D"/>
+                </a:solidFill>
+                <a:latin typeface="Arial" panose="020B0604020202020204" pitchFamily="34" charset="0"/>
+              </a:rPr>
+              <a:t>. </a:t>
             </a:r>
             <a:r>
               <a:rPr lang="en-US" sz="2000" b="1" dirty="0">
@@ -6991,7 +7009,7 @@
                 <a:effectLst/>
                 <a:latin typeface="-apple-system"/>
               </a:rPr>
-              <a:t>Parallelism or multi-threading in software terms is defined as the ability of the software, operating system, or program to execute multiple parts or sub-components of another program simultaneously. TestNG allows the tests to run in parallel or multi-threaded mode. This means that based on the test suite configuration, different threads are started simultaneously and the test methods are executed in them. This gives a user a lot of advantages over normal execution, mainly</a:t>
+              <a:t>Parallelism or multi-threading in software terms is defined as the ability of the software, operating system, or program to execute multiple parts or sub-components of another program simultaneously. TestNG allows the tests to run in parallel or multi-threaded mode. This means that based on the test suite configuration, different threads are started simultaneously, and the test methods are executed in them. This gives a user a lot of advantages over normal execution, mainly</a:t>
             </a:r>
           </a:p>
           <a:p>

</xml_diff>